<commit_message>
Add about page pic
</commit_message>
<xml_diff>
--- a/docs/pics/source.pptx
+++ b/docs/pics/source.pptx
@@ -7,9 +7,10 @@
   <p:sldIdLst>
     <p:sldId id="256" r:id="rId2"/>
     <p:sldId id="257" r:id="rId3"/>
-    <p:sldId id="260" r:id="rId4"/>
-    <p:sldId id="258" r:id="rId5"/>
-    <p:sldId id="259" r:id="rId6"/>
+    <p:sldId id="261" r:id="rId4"/>
+    <p:sldId id="260" r:id="rId5"/>
+    <p:sldId id="258" r:id="rId6"/>
+    <p:sldId id="259" r:id="rId7"/>
   </p:sldIdLst>
   <p:sldSz cx="12192000" cy="6858000"/>
   <p:notesSz cx="6858000" cy="9144000"/>
@@ -108,6 +109,11 @@
       </a:defRPr>
     </a:lvl9pPr>
   </p:defaultTextStyle>
+  <p:extLst>
+    <p:ext uri="{EFAFB233-063F-42B5-8137-9DF3F51BA10A}">
+      <p15:sldGuideLst xmlns:p15="http://schemas.microsoft.com/office/powerpoint/2012/main"/>
+    </p:ext>
+  </p:extLst>
 </p:presentation>
 </file>
 
@@ -258,7 +264,7 @@
           <a:p>
             <a:fld id="{FFFD76D0-BFE3-4BCD-8ABA-839206452448}" type="datetimeFigureOut">
               <a:rPr lang="he-IL" smtClean="0"/>
-              <a:t>י"ג/כסלו/תשפ"ד</a:t>
+              <a:t>ב'/טבת/תשפ"ד</a:t>
             </a:fld>
             <a:endParaRPr lang="he-IL"/>
           </a:p>
@@ -456,7 +462,7 @@
           <a:p>
             <a:fld id="{FFFD76D0-BFE3-4BCD-8ABA-839206452448}" type="datetimeFigureOut">
               <a:rPr lang="he-IL" smtClean="0"/>
-              <a:t>י"ג/כסלו/תשפ"ד</a:t>
+              <a:t>ב'/טבת/תשפ"ד</a:t>
             </a:fld>
             <a:endParaRPr lang="he-IL"/>
           </a:p>
@@ -664,7 +670,7 @@
           <a:p>
             <a:fld id="{FFFD76D0-BFE3-4BCD-8ABA-839206452448}" type="datetimeFigureOut">
               <a:rPr lang="he-IL" smtClean="0"/>
-              <a:t>י"ג/כסלו/תשפ"ד</a:t>
+              <a:t>ב'/טבת/תשפ"ד</a:t>
             </a:fld>
             <a:endParaRPr lang="he-IL"/>
           </a:p>
@@ -862,7 +868,7 @@
           <a:p>
             <a:fld id="{FFFD76D0-BFE3-4BCD-8ABA-839206452448}" type="datetimeFigureOut">
               <a:rPr lang="he-IL" smtClean="0"/>
-              <a:t>י"ג/כסלו/תשפ"ד</a:t>
+              <a:t>ב'/טבת/תשפ"ד</a:t>
             </a:fld>
             <a:endParaRPr lang="he-IL"/>
           </a:p>
@@ -1137,7 +1143,7 @@
           <a:p>
             <a:fld id="{FFFD76D0-BFE3-4BCD-8ABA-839206452448}" type="datetimeFigureOut">
               <a:rPr lang="he-IL" smtClean="0"/>
-              <a:t>י"ג/כסלו/תשפ"ד</a:t>
+              <a:t>ב'/טבת/תשפ"ד</a:t>
             </a:fld>
             <a:endParaRPr lang="he-IL"/>
           </a:p>
@@ -1402,7 +1408,7 @@
           <a:p>
             <a:fld id="{FFFD76D0-BFE3-4BCD-8ABA-839206452448}" type="datetimeFigureOut">
               <a:rPr lang="he-IL" smtClean="0"/>
-              <a:t>י"ג/כסלו/תשפ"ד</a:t>
+              <a:t>ב'/טבת/תשפ"ד</a:t>
             </a:fld>
             <a:endParaRPr lang="he-IL"/>
           </a:p>
@@ -1814,7 +1820,7 @@
           <a:p>
             <a:fld id="{FFFD76D0-BFE3-4BCD-8ABA-839206452448}" type="datetimeFigureOut">
               <a:rPr lang="he-IL" smtClean="0"/>
-              <a:t>י"ג/כסלו/תשפ"ד</a:t>
+              <a:t>ב'/טבת/תשפ"ד</a:t>
             </a:fld>
             <a:endParaRPr lang="he-IL"/>
           </a:p>
@@ -1955,7 +1961,7 @@
           <a:p>
             <a:fld id="{FFFD76D0-BFE3-4BCD-8ABA-839206452448}" type="datetimeFigureOut">
               <a:rPr lang="he-IL" smtClean="0"/>
-              <a:t>י"ג/כסלו/תשפ"ד</a:t>
+              <a:t>ב'/טבת/תשפ"ד</a:t>
             </a:fld>
             <a:endParaRPr lang="he-IL"/>
           </a:p>
@@ -2068,7 +2074,7 @@
           <a:p>
             <a:fld id="{FFFD76D0-BFE3-4BCD-8ABA-839206452448}" type="datetimeFigureOut">
               <a:rPr lang="he-IL" smtClean="0"/>
-              <a:t>י"ג/כסלו/תשפ"ד</a:t>
+              <a:t>ב'/טבת/תשפ"ד</a:t>
             </a:fld>
             <a:endParaRPr lang="he-IL"/>
           </a:p>
@@ -2379,7 +2385,7 @@
           <a:p>
             <a:fld id="{FFFD76D0-BFE3-4BCD-8ABA-839206452448}" type="datetimeFigureOut">
               <a:rPr lang="he-IL" smtClean="0"/>
-              <a:t>י"ג/כסלו/תשפ"ד</a:t>
+              <a:t>ב'/טבת/תשפ"ד</a:t>
             </a:fld>
             <a:endParaRPr lang="he-IL"/>
           </a:p>
@@ -2667,7 +2673,7 @@
           <a:p>
             <a:fld id="{FFFD76D0-BFE3-4BCD-8ABA-839206452448}" type="datetimeFigureOut">
               <a:rPr lang="he-IL" smtClean="0"/>
-              <a:t>י"ג/כסלו/תשפ"ד</a:t>
+              <a:t>ב'/טבת/תשפ"ד</a:t>
             </a:fld>
             <a:endParaRPr lang="he-IL"/>
           </a:p>
@@ -2908,7 +2914,7 @@
           <a:p>
             <a:fld id="{FFFD76D0-BFE3-4BCD-8ABA-839206452448}" type="datetimeFigureOut">
               <a:rPr lang="he-IL" smtClean="0"/>
-              <a:t>י"ג/כסלו/תשפ"ד</a:t>
+              <a:t>ב'/טבת/תשפ"ד</a:t>
             </a:fld>
             <a:endParaRPr lang="he-IL"/>
           </a:p>
@@ -3591,6 +3597,65 @@
       </p:grpSpPr>
       <p:pic>
         <p:nvPicPr>
+          <p:cNvPr id="4" name="תמונה 3">
+            <a:extLst>
+              <a:ext uri="{FF2B5EF4-FFF2-40B4-BE49-F238E27FC236}">
+                <a16:creationId xmlns:a16="http://schemas.microsoft.com/office/drawing/2014/main" id="{8E6C7DE1-BA0C-D1DA-9AB5-912730D58971}"/>
+              </a:ext>
+            </a:extLst>
+          </p:cNvPr>
+          <p:cNvPicPr>
+            <a:picLocks noChangeAspect="1"/>
+          </p:cNvPicPr>
+          <p:nvPr/>
+        </p:nvPicPr>
+        <p:blipFill rotWithShape="1">
+          <a:blip r:embed="rId2"/>
+          <a:srcRect b="6304"/>
+          <a:stretch/>
+        </p:blipFill>
+        <p:spPr>
+          <a:xfrm>
+            <a:off x="7153425" y="185531"/>
+            <a:ext cx="4812626" cy="5946122"/>
+          </a:xfrm>
+          <a:prstGeom prst="rect">
+            <a:avLst/>
+          </a:prstGeom>
+        </p:spPr>
+      </p:pic>
+    </p:spTree>
+    <p:extLst>
+      <p:ext uri="{BB962C8B-B14F-4D97-AF65-F5344CB8AC3E}">
+        <p14:creationId xmlns:p14="http://schemas.microsoft.com/office/powerpoint/2010/main" val="2078122068"/>
+      </p:ext>
+    </p:extLst>
+  </p:cSld>
+  <p:clrMapOvr>
+    <a:masterClrMapping/>
+  </p:clrMapOvr>
+</p:sld>
+</file>
+
+<file path=ppt/slides/slide4.xml><?xml version="1.0" encoding="utf-8"?>
+<p:sld xmlns:a="http://schemas.openxmlformats.org/drawingml/2006/main" xmlns:r="http://schemas.openxmlformats.org/officeDocument/2006/relationships" xmlns:p="http://schemas.openxmlformats.org/presentationml/2006/main">
+  <p:cSld>
+    <p:spTree>
+      <p:nvGrpSpPr>
+        <p:cNvPr id="1" name=""/>
+        <p:cNvGrpSpPr/>
+        <p:nvPr/>
+      </p:nvGrpSpPr>
+      <p:grpSpPr>
+        <a:xfrm>
+          <a:off x="0" y="0"/>
+          <a:ext cx="0" cy="0"/>
+          <a:chOff x="0" y="0"/>
+          <a:chExt cx="0" cy="0"/>
+        </a:xfrm>
+      </p:grpSpPr>
+      <p:pic>
+        <p:nvPicPr>
           <p:cNvPr id="6" name="תמונה 5">
             <a:extLst>
               <a:ext uri="{FF2B5EF4-FFF2-40B4-BE49-F238E27FC236}">
@@ -3692,7 +3757,7 @@
 </p:sld>
 </file>
 
-<file path=ppt/slides/slide4.xml><?xml version="1.0" encoding="utf-8"?>
+<file path=ppt/slides/slide5.xml><?xml version="1.0" encoding="utf-8"?>
 <p:sld xmlns:a="http://schemas.openxmlformats.org/drawingml/2006/main" xmlns:r="http://schemas.openxmlformats.org/officeDocument/2006/relationships" xmlns:p="http://schemas.openxmlformats.org/presentationml/2006/main">
   <p:cSld>
     <p:spTree>
@@ -3812,7 +3877,7 @@
 </p:sld>
 </file>
 
-<file path=ppt/slides/slide5.xml><?xml version="1.0" encoding="utf-8"?>
+<file path=ppt/slides/slide6.xml><?xml version="1.0" encoding="utf-8"?>
 <p:sld xmlns:a="http://schemas.openxmlformats.org/drawingml/2006/main" xmlns:r="http://schemas.openxmlformats.org/officeDocument/2006/relationships" xmlns:p="http://schemas.openxmlformats.org/presentationml/2006/main">
   <p:cSld>
     <p:spTree>

</xml_diff>